<commit_message>
[#10741] Separate out L&P tests from E2E tests (#10759)
</commit_message>
<xml_diff>
--- a/docs/images/E2EComponent.pptx
+++ b/docs/images/E2EComponent.pptx
@@ -209,7 +209,7 @@
             <a:fld id="{AF301891-4E62-472A-98E9-95DBD40531A4}" type="datetimeFigureOut">
               <a:rPr lang="en-SG" smtClean="0"/>
               <a:pPr/>
-              <a:t>14/8/2020</a:t>
+              <a:t>31/10/2020</a:t>
             </a:fld>
             <a:endParaRPr lang="en-SG"/>
           </a:p>
@@ -764,7 +764,7 @@
             <a:fld id="{1D8BD707-D9CF-40AE-B4C6-C98DA3205C09}" type="datetimeFigureOut">
               <a:rPr lang="en-US" smtClean="0"/>
               <a:pPr/>
-              <a:t>8/14/2020</a:t>
+              <a:t>10/31/2020</a:t>
             </a:fld>
             <a:endParaRPr lang="en-US"/>
           </a:p>
@@ -978,7 +978,7 @@
             <a:fld id="{1D8BD707-D9CF-40AE-B4C6-C98DA3205C09}" type="datetimeFigureOut">
               <a:rPr lang="en-US" smtClean="0"/>
               <a:pPr/>
-              <a:t>8/14/2020</a:t>
+              <a:t>10/31/2020</a:t>
             </a:fld>
             <a:endParaRPr lang="en-US"/>
           </a:p>
@@ -1185,7 +1185,7 @@
             <a:fld id="{1D8BD707-D9CF-40AE-B4C6-C98DA3205C09}" type="datetimeFigureOut">
               <a:rPr lang="en-US" smtClean="0"/>
               <a:pPr/>
-              <a:t>8/14/2020</a:t>
+              <a:t>10/31/2020</a:t>
             </a:fld>
             <a:endParaRPr lang="en-US"/>
           </a:p>
@@ -1392,7 +1392,7 @@
             <a:fld id="{1D8BD707-D9CF-40AE-B4C6-C98DA3205C09}" type="datetimeFigureOut">
               <a:rPr lang="en-US" smtClean="0"/>
               <a:pPr/>
-              <a:t>8/14/2020</a:t>
+              <a:t>10/31/2020</a:t>
             </a:fld>
             <a:endParaRPr lang="en-US"/>
           </a:p>
@@ -1665,7 +1665,7 @@
             <a:fld id="{1D8BD707-D9CF-40AE-B4C6-C98DA3205C09}" type="datetimeFigureOut">
               <a:rPr lang="en-US" smtClean="0"/>
               <a:pPr/>
-              <a:t>8/14/2020</a:t>
+              <a:t>10/31/2020</a:t>
             </a:fld>
             <a:endParaRPr lang="en-US"/>
           </a:p>
@@ -1988,7 +1988,7 @@
             <a:fld id="{1D8BD707-D9CF-40AE-B4C6-C98DA3205C09}" type="datetimeFigureOut">
               <a:rPr lang="en-US" smtClean="0"/>
               <a:pPr/>
-              <a:t>8/14/2020</a:t>
+              <a:t>10/31/2020</a:t>
             </a:fld>
             <a:endParaRPr lang="en-US"/>
           </a:p>
@@ -2451,7 +2451,7 @@
             <a:fld id="{1D8BD707-D9CF-40AE-B4C6-C98DA3205C09}" type="datetimeFigureOut">
               <a:rPr lang="en-US" smtClean="0"/>
               <a:pPr/>
-              <a:t>8/14/2020</a:t>
+              <a:t>10/31/2020</a:t>
             </a:fld>
             <a:endParaRPr lang="en-US"/>
           </a:p>
@@ -2598,7 +2598,7 @@
             <a:fld id="{1D8BD707-D9CF-40AE-B4C6-C98DA3205C09}" type="datetimeFigureOut">
               <a:rPr lang="en-US" smtClean="0"/>
               <a:pPr/>
-              <a:t>8/14/2020</a:t>
+              <a:t>10/31/2020</a:t>
             </a:fld>
             <a:endParaRPr lang="en-US"/>
           </a:p>
@@ -2714,7 +2714,7 @@
             <a:fld id="{1D8BD707-D9CF-40AE-B4C6-C98DA3205C09}" type="datetimeFigureOut">
               <a:rPr lang="en-US" smtClean="0"/>
               <a:pPr/>
-              <a:t>8/14/2020</a:t>
+              <a:t>10/31/2020</a:t>
             </a:fld>
             <a:endParaRPr lang="en-US"/>
           </a:p>
@@ -3021,7 +3021,7 @@
             <a:fld id="{1D8BD707-D9CF-40AE-B4C6-C98DA3205C09}" type="datetimeFigureOut">
               <a:rPr lang="en-US" smtClean="0"/>
               <a:pPr/>
-              <a:t>8/14/2020</a:t>
+              <a:t>10/31/2020</a:t>
             </a:fld>
             <a:endParaRPr lang="en-US"/>
           </a:p>
@@ -3304,7 +3304,7 @@
             <a:fld id="{1D8BD707-D9CF-40AE-B4C6-C98DA3205C09}" type="datetimeFigureOut">
               <a:rPr lang="en-US" smtClean="0"/>
               <a:pPr/>
-              <a:t>8/14/2020</a:t>
+              <a:t>10/31/2020</a:t>
             </a:fld>
             <a:endParaRPr lang="en-US"/>
           </a:p>
@@ -4352,150 +4352,6 @@
           </a:p>
         </p:txBody>
       </p:sp>
-      <p:grpSp>
-        <p:nvGrpSpPr>
-          <p:cNvPr id="196" name="Group 195"/>
-          <p:cNvGrpSpPr/>
-          <p:nvPr/>
-        </p:nvGrpSpPr>
-        <p:grpSpPr>
-          <a:xfrm>
-            <a:off x="1600285" y="3165848"/>
-            <a:ext cx="2405814" cy="872695"/>
-            <a:chOff x="3190875" y="1032305"/>
-            <a:chExt cx="2362200" cy="872695"/>
-          </a:xfrm>
-          <a:solidFill>
-            <a:schemeClr val="bg1">
-              <a:lumMod val="75000"/>
-            </a:schemeClr>
-          </a:solidFill>
-        </p:grpSpPr>
-        <p:sp>
-          <p:nvSpPr>
-            <p:cNvPr id="197" name="Rectangle 35"/>
-            <p:cNvSpPr/>
-            <p:nvPr/>
-          </p:nvSpPr>
-          <p:spPr>
-            <a:xfrm>
-              <a:off x="3190875" y="1032305"/>
-              <a:ext cx="2362200" cy="872695"/>
-            </a:xfrm>
-            <a:custGeom>
-              <a:avLst/>
-              <a:gdLst/>
-              <a:ahLst/>
-              <a:cxnLst/>
-              <a:rect l="l" t="t" r="r" b="b"/>
-              <a:pathLst>
-                <a:path w="2362200" h="1101295">
-                  <a:moveTo>
-                    <a:pt x="1524000" y="0"/>
-                  </a:moveTo>
-                  <a:lnTo>
-                    <a:pt x="2361824" y="0"/>
-                  </a:lnTo>
-                  <a:lnTo>
-                    <a:pt x="2361824" y="129015"/>
-                  </a:lnTo>
-                  <a:lnTo>
-                    <a:pt x="2362200" y="129015"/>
-                  </a:lnTo>
-                  <a:lnTo>
-                    <a:pt x="2362200" y="1101295"/>
-                  </a:lnTo>
-                  <a:lnTo>
-                    <a:pt x="0" y="1101295"/>
-                  </a:lnTo>
-                  <a:lnTo>
-                    <a:pt x="0" y="129015"/>
-                  </a:lnTo>
-                  <a:lnTo>
-                    <a:pt x="1524000" y="129015"/>
-                  </a:lnTo>
-                  <a:close/>
-                </a:path>
-              </a:pathLst>
-            </a:custGeom>
-            <a:grpFill/>
-            <a:ln>
-              <a:noFill/>
-            </a:ln>
-          </p:spPr>
-          <p:style>
-            <a:lnRef idx="2">
-              <a:schemeClr val="accent1">
-                <a:shade val="50000"/>
-              </a:schemeClr>
-            </a:lnRef>
-            <a:fillRef idx="1">
-              <a:schemeClr val="accent1"/>
-            </a:fillRef>
-            <a:effectRef idx="0">
-              <a:schemeClr val="accent1"/>
-            </a:effectRef>
-            <a:fontRef idx="minor">
-              <a:schemeClr val="lt1"/>
-            </a:fontRef>
-          </p:style>
-          <p:txBody>
-            <a:bodyPr rtlCol="0" anchor="t" anchorCtr="0"/>
-            <a:lstStyle/>
-            <a:p>
-              <a:pPr>
-                <a:lnSpc>
-                  <a:spcPct val="150000"/>
-                </a:lnSpc>
-                <a:spcBef>
-                  <a:spcPts val="600"/>
-                </a:spcBef>
-              </a:pPr>
-              <a:r>
-                <a:rPr lang="en-US" sz="1400" b="1" dirty="0" smtClean="0"/>
-                <a:t>::e2e</a:t>
-              </a:r>
-              <a:endParaRPr lang="en-SG" sz="1400" b="1" dirty="0"/>
-            </a:p>
-          </p:txBody>
-        </p:sp>
-        <p:cxnSp>
-          <p:nvCxnSpPr>
-            <p:cNvPr id="198" name="Straight Connector 197"/>
-            <p:cNvCxnSpPr/>
-            <p:nvPr/>
-          </p:nvCxnSpPr>
-          <p:spPr>
-            <a:xfrm>
-              <a:off x="4714875" y="1123350"/>
-              <a:ext cx="838200" cy="0"/>
-            </a:xfrm>
-            <a:prstGeom prst="line">
-              <a:avLst/>
-            </a:prstGeom>
-            <a:grpFill/>
-            <a:ln w="19050">
-              <a:solidFill>
-                <a:schemeClr val="bg1"/>
-              </a:solidFill>
-            </a:ln>
-          </p:spPr>
-          <p:style>
-            <a:lnRef idx="1">
-              <a:schemeClr val="accent1"/>
-            </a:lnRef>
-            <a:fillRef idx="0">
-              <a:schemeClr val="accent1"/>
-            </a:fillRef>
-            <a:effectRef idx="0">
-              <a:schemeClr val="accent1"/>
-            </a:effectRef>
-            <a:fontRef idx="minor">
-              <a:schemeClr val="tx1"/>
-            </a:fontRef>
-          </p:style>
-        </p:cxnSp>
-      </p:grpSp>
       <p:sp>
         <p:nvSpPr>
           <p:cNvPr id="199" name="Rectangle 198"/>
@@ -4504,8 +4360,8 @@
         </p:nvSpPr>
         <p:spPr>
           <a:xfrm>
-            <a:off x="1720098" y="3577172"/>
-            <a:ext cx="2129427" cy="365583"/>
+            <a:off x="5072898" y="3404412"/>
+            <a:ext cx="2816977" cy="365583"/>
           </a:xfrm>
           <a:prstGeom prst="rect">
             <a:avLst/>
@@ -4534,160 +4390,12 @@
             <a:pPr algn="ctr"/>
             <a:r>
               <a:rPr lang="en-US" sz="1600" b="1" dirty="0" smtClean="0"/>
-              <a:t>E2E tests</a:t>
+              <a:t>InstructorHomePageE2ETest</a:t>
             </a:r>
             <a:endParaRPr lang="en-SG" sz="1600" b="1" dirty="0"/>
           </a:p>
         </p:txBody>
       </p:sp>
-      <p:grpSp>
-        <p:nvGrpSpPr>
-          <p:cNvPr id="200" name="Group 199"/>
-          <p:cNvGrpSpPr/>
-          <p:nvPr/>
-        </p:nvGrpSpPr>
-        <p:grpSpPr>
-          <a:xfrm>
-            <a:off x="5070475" y="3165848"/>
-            <a:ext cx="2405814" cy="872695"/>
-            <a:chOff x="3190875" y="1032305"/>
-            <a:chExt cx="2362200" cy="872695"/>
-          </a:xfrm>
-          <a:solidFill>
-            <a:schemeClr val="bg1">
-              <a:lumMod val="75000"/>
-            </a:schemeClr>
-          </a:solidFill>
-        </p:grpSpPr>
-        <p:sp>
-          <p:nvSpPr>
-            <p:cNvPr id="201" name="Rectangle 35"/>
-            <p:cNvSpPr/>
-            <p:nvPr/>
-          </p:nvSpPr>
-          <p:spPr>
-            <a:xfrm>
-              <a:off x="3190875" y="1032305"/>
-              <a:ext cx="2362200" cy="872695"/>
-            </a:xfrm>
-            <a:custGeom>
-              <a:avLst/>
-              <a:gdLst/>
-              <a:ahLst/>
-              <a:cxnLst/>
-              <a:rect l="l" t="t" r="r" b="b"/>
-              <a:pathLst>
-                <a:path w="2362200" h="1101295">
-                  <a:moveTo>
-                    <a:pt x="1524000" y="0"/>
-                  </a:moveTo>
-                  <a:lnTo>
-                    <a:pt x="2361824" y="0"/>
-                  </a:lnTo>
-                  <a:lnTo>
-                    <a:pt x="2361824" y="129015"/>
-                  </a:lnTo>
-                  <a:lnTo>
-                    <a:pt x="2362200" y="129015"/>
-                  </a:lnTo>
-                  <a:lnTo>
-                    <a:pt x="2362200" y="1101295"/>
-                  </a:lnTo>
-                  <a:lnTo>
-                    <a:pt x="0" y="1101295"/>
-                  </a:lnTo>
-                  <a:lnTo>
-                    <a:pt x="0" y="129015"/>
-                  </a:lnTo>
-                  <a:lnTo>
-                    <a:pt x="1524000" y="129015"/>
-                  </a:lnTo>
-                  <a:close/>
-                </a:path>
-              </a:pathLst>
-            </a:custGeom>
-            <a:grpFill/>
-            <a:ln>
-              <a:noFill/>
-            </a:ln>
-          </p:spPr>
-          <p:style>
-            <a:lnRef idx="2">
-              <a:schemeClr val="accent1">
-                <a:shade val="50000"/>
-              </a:schemeClr>
-            </a:lnRef>
-            <a:fillRef idx="1">
-              <a:schemeClr val="accent1"/>
-            </a:fillRef>
-            <a:effectRef idx="0">
-              <a:schemeClr val="accent1"/>
-            </a:effectRef>
-            <a:fontRef idx="minor">
-              <a:schemeClr val="lt1"/>
-            </a:fontRef>
-          </p:style>
-          <p:txBody>
-            <a:bodyPr rtlCol="0" anchor="t" anchorCtr="0"/>
-            <a:lstStyle/>
-            <a:p>
-              <a:pPr>
-                <a:lnSpc>
-                  <a:spcPct val="150000"/>
-                </a:lnSpc>
-                <a:spcBef>
-                  <a:spcPts val="600"/>
-                </a:spcBef>
-              </a:pPr>
-              <a:r>
-                <a:rPr lang="en-US" sz="1400" b="1" dirty="0" smtClean="0"/>
-                <a:t>::</a:t>
-              </a:r>
-              <a:r>
-                <a:rPr lang="en-US" sz="1400" b="1" dirty="0" err="1" smtClean="0"/>
-                <a:t>lnp</a:t>
-              </a:r>
-              <a:endParaRPr lang="en-SG" sz="1400" b="1" dirty="0"/>
-            </a:p>
-          </p:txBody>
-        </p:sp>
-        <p:cxnSp>
-          <p:nvCxnSpPr>
-            <p:cNvPr id="202" name="Straight Connector 201"/>
-            <p:cNvCxnSpPr/>
-            <p:nvPr/>
-          </p:nvCxnSpPr>
-          <p:spPr>
-            <a:xfrm>
-              <a:off x="4714875" y="1123350"/>
-              <a:ext cx="838200" cy="0"/>
-            </a:xfrm>
-            <a:prstGeom prst="line">
-              <a:avLst/>
-            </a:prstGeom>
-            <a:grpFill/>
-            <a:ln w="19050">
-              <a:solidFill>
-                <a:schemeClr val="bg1"/>
-              </a:solidFill>
-            </a:ln>
-          </p:spPr>
-          <p:style>
-            <a:lnRef idx="1">
-              <a:schemeClr val="accent1"/>
-            </a:lnRef>
-            <a:fillRef idx="0">
-              <a:schemeClr val="accent1"/>
-            </a:fillRef>
-            <a:effectRef idx="0">
-              <a:schemeClr val="accent1"/>
-            </a:effectRef>
-            <a:fontRef idx="minor">
-              <a:schemeClr val="tx1"/>
-            </a:fontRef>
-          </p:style>
-        </p:cxnSp>
-      </p:grpSp>
       <p:sp>
         <p:nvSpPr>
           <p:cNvPr id="203" name="Rectangle 202"/>
@@ -4696,7 +4404,7 @@
         </p:nvSpPr>
         <p:spPr>
           <a:xfrm>
-            <a:off x="5190288" y="3577172"/>
+            <a:off x="1493248" y="3404413"/>
             <a:ext cx="2129427" cy="365583"/>
           </a:xfrm>
           <a:prstGeom prst="rect">
@@ -4726,7 +4434,7 @@
             <a:pPr algn="ctr"/>
             <a:r>
               <a:rPr lang="en-US" sz="1600" b="1" dirty="0" smtClean="0"/>
-              <a:t>L&amp;P tests</a:t>
+              <a:t>BaseE2ETestCase</a:t>
             </a:r>
             <a:endParaRPr lang="en-SG" sz="1600" b="1" dirty="0"/>
           </a:p>
@@ -5415,13 +5123,13 @@
       </p:cxnSp>
       <p:sp>
         <p:nvSpPr>
-          <p:cNvPr id="66" name="Rectangle 65"/>
+          <p:cNvPr id="69" name="Rectangle 68"/>
           <p:cNvSpPr/>
           <p:nvPr/>
         </p:nvSpPr>
         <p:spPr>
           <a:xfrm>
-            <a:off x="597555" y="1721568"/>
+            <a:off x="1260475" y="1721568"/>
             <a:ext cx="1800000" cy="360000"/>
           </a:xfrm>
           <a:prstGeom prst="rect">
@@ -5450,128 +5158,6 @@
           <a:p>
             <a:pPr algn="ctr"/>
             <a:r>
-              <a:rPr lang="en-US" sz="1600" b="1" dirty="0" err="1" smtClean="0"/>
-              <a:t>BrowserPool</a:t>
-            </a:r>
-            <a:endParaRPr lang="en-SG" sz="1600" b="1" dirty="0"/>
-          </a:p>
-        </p:txBody>
-      </p:sp>
-      <p:sp>
-        <p:nvSpPr>
-          <p:cNvPr id="67" name="Flowchart: Decision 66"/>
-          <p:cNvSpPr/>
-          <p:nvPr/>
-        </p:nvSpPr>
-        <p:spPr>
-          <a:xfrm>
-            <a:off x="2397555" y="1837653"/>
-            <a:ext cx="141518" cy="127830"/>
-          </a:xfrm>
-          <a:prstGeom prst="flowChartDecision">
-            <a:avLst/>
-          </a:prstGeom>
-        </p:spPr>
-        <p:style>
-          <a:lnRef idx="2">
-            <a:schemeClr val="accent4">
-              <a:shade val="50000"/>
-            </a:schemeClr>
-          </a:lnRef>
-          <a:fillRef idx="1">
-            <a:schemeClr val="accent4"/>
-          </a:fillRef>
-          <a:effectRef idx="0">
-            <a:schemeClr val="accent4"/>
-          </a:effectRef>
-          <a:fontRef idx="minor">
-            <a:schemeClr val="lt1"/>
-          </a:fontRef>
-        </p:style>
-        <p:txBody>
-          <a:bodyPr rtlCol="0" anchor="ctr"/>
-          <a:lstStyle/>
-          <a:p>
-            <a:pPr algn="ctr"/>
-            <a:endParaRPr lang="en-SG"/>
-          </a:p>
-        </p:txBody>
-      </p:sp>
-      <p:cxnSp>
-        <p:nvCxnSpPr>
-          <p:cNvPr id="68" name="Elbow Connector 67"/>
-          <p:cNvCxnSpPr>
-            <a:stCxn id="69" idx="1"/>
-            <a:endCxn id="67" idx="3"/>
-          </p:cNvCxnSpPr>
-          <p:nvPr/>
-        </p:nvCxnSpPr>
-        <p:spPr>
-          <a:xfrm rot="10800000">
-            <a:off x="2539073" y="1914268"/>
-            <a:ext cx="198002" cy="0"/>
-          </a:xfrm>
-          <a:prstGeom prst="bentConnector3">
-            <a:avLst>
-              <a:gd name="adj1" fmla="val 50000"/>
-            </a:avLst>
-          </a:prstGeom>
-          <a:ln/>
-        </p:spPr>
-        <p:style>
-          <a:lnRef idx="2">
-            <a:schemeClr val="accent4">
-              <a:shade val="50000"/>
-            </a:schemeClr>
-          </a:lnRef>
-          <a:fillRef idx="1">
-            <a:schemeClr val="accent4"/>
-          </a:fillRef>
-          <a:effectRef idx="0">
-            <a:schemeClr val="accent4"/>
-          </a:effectRef>
-          <a:fontRef idx="minor">
-            <a:schemeClr val="lt1"/>
-          </a:fontRef>
-        </p:style>
-      </p:cxnSp>
-      <p:sp>
-        <p:nvSpPr>
-          <p:cNvPr id="69" name="Rectangle 68"/>
-          <p:cNvSpPr/>
-          <p:nvPr/>
-        </p:nvSpPr>
-        <p:spPr>
-          <a:xfrm>
-            <a:off x="2737075" y="1721568"/>
-            <a:ext cx="1800000" cy="360000"/>
-          </a:xfrm>
-          <a:prstGeom prst="rect">
-            <a:avLst/>
-          </a:prstGeom>
-        </p:spPr>
-        <p:style>
-          <a:lnRef idx="2">
-            <a:schemeClr val="accent4">
-              <a:shade val="50000"/>
-            </a:schemeClr>
-          </a:lnRef>
-          <a:fillRef idx="1">
-            <a:schemeClr val="accent4"/>
-          </a:fillRef>
-          <a:effectRef idx="0">
-            <a:schemeClr val="accent4"/>
-          </a:effectRef>
-          <a:fontRef idx="minor">
-            <a:schemeClr val="lt1"/>
-          </a:fontRef>
-        </p:style>
-        <p:txBody>
-          <a:bodyPr rtlCol="0" anchor="ctr"/>
-          <a:lstStyle/>
-          <a:p>
-            <a:pPr algn="ctr"/>
-            <a:r>
               <a:rPr lang="en-US" sz="1600" b="1" dirty="0" smtClean="0"/>
               <a:t>Browser</a:t>
             </a:r>
@@ -5587,7 +5173,7 @@
         </p:nvSpPr>
         <p:spPr>
           <a:xfrm>
-            <a:off x="7184919" y="1721568"/>
+            <a:off x="6594475" y="1773600"/>
             <a:ext cx="1799999" cy="360000"/>
           </a:xfrm>
           <a:prstGeom prst="rect">
@@ -5631,7 +5217,7 @@
         </p:nvSpPr>
         <p:spPr>
           <a:xfrm rot="5400000">
-            <a:off x="7044018" y="1849536"/>
+            <a:off x="6442075" y="1881600"/>
             <a:ext cx="144000" cy="144000"/>
           </a:xfrm>
           <a:prstGeom prst="triangle">
@@ -5671,7 +5257,7 @@
         </p:nvGrpSpPr>
         <p:grpSpPr>
           <a:xfrm>
-            <a:off x="4765675" y="1669536"/>
+            <a:off x="3836195" y="1669536"/>
             <a:ext cx="1920080" cy="464064"/>
             <a:chOff x="7005724" y="2667000"/>
             <a:chExt cx="1920080" cy="464064"/>
@@ -5813,8 +5399,8 @@
         </p:nvCxnSpPr>
         <p:spPr>
           <a:xfrm flipH="1">
-            <a:off x="6685755" y="1921536"/>
-            <a:ext cx="358263" cy="0"/>
+            <a:off x="5756275" y="1953600"/>
+            <a:ext cx="685800" cy="0"/>
           </a:xfrm>
           <a:prstGeom prst="line">
             <a:avLst/>
@@ -5999,6 +5585,254 @@
                 <a:schemeClr val="tx1"/>
               </a:solidFill>
             </a:endParaRPr>
+          </a:p>
+        </p:txBody>
+      </p:sp>
+      <p:sp>
+        <p:nvSpPr>
+          <p:cNvPr id="38" name="Rectangle 37"/>
+          <p:cNvSpPr/>
+          <p:nvPr/>
+        </p:nvSpPr>
+        <p:spPr>
+          <a:xfrm>
+            <a:off x="5071700" y="2870889"/>
+            <a:ext cx="2816977" cy="365583"/>
+          </a:xfrm>
+          <a:prstGeom prst="rect">
+            <a:avLst/>
+          </a:prstGeom>
+        </p:spPr>
+        <p:style>
+          <a:lnRef idx="2">
+            <a:schemeClr val="accent6">
+              <a:shade val="50000"/>
+            </a:schemeClr>
+          </a:lnRef>
+          <a:fillRef idx="1">
+            <a:schemeClr val="accent6"/>
+          </a:fillRef>
+          <a:effectRef idx="0">
+            <a:schemeClr val="accent6"/>
+          </a:effectRef>
+          <a:fontRef idx="minor">
+            <a:schemeClr val="lt1"/>
+          </a:fontRef>
+        </p:style>
+        <p:txBody>
+          <a:bodyPr rtlCol="0" anchor="ctr"/>
+          <a:lstStyle/>
+          <a:p>
+            <a:pPr algn="ctr"/>
+            <a:r>
+              <a:rPr lang="en-US" sz="1600" b="1" dirty="0" smtClean="0"/>
+              <a:t>StudentHomePageE2ETest</a:t>
+            </a:r>
+            <a:endParaRPr lang="en-SG" sz="1600" b="1" dirty="0"/>
+          </a:p>
+        </p:txBody>
+      </p:sp>
+      <p:sp>
+        <p:nvSpPr>
+          <p:cNvPr id="39" name="Rectangle 38"/>
+          <p:cNvSpPr/>
+          <p:nvPr/>
+        </p:nvSpPr>
+        <p:spPr>
+          <a:xfrm>
+            <a:off x="5071700" y="3915561"/>
+            <a:ext cx="2816977" cy="365583"/>
+          </a:xfrm>
+          <a:prstGeom prst="rect">
+            <a:avLst/>
+          </a:prstGeom>
+        </p:spPr>
+        <p:style>
+          <a:lnRef idx="2">
+            <a:schemeClr val="accent6">
+              <a:shade val="50000"/>
+            </a:schemeClr>
+          </a:lnRef>
+          <a:fillRef idx="1">
+            <a:schemeClr val="accent6"/>
+          </a:fillRef>
+          <a:effectRef idx="0">
+            <a:schemeClr val="accent6"/>
+          </a:effectRef>
+          <a:fontRef idx="minor">
+            <a:schemeClr val="lt1"/>
+          </a:fontRef>
+        </p:style>
+        <p:txBody>
+          <a:bodyPr rtlCol="0" anchor="ctr"/>
+          <a:lstStyle/>
+          <a:p>
+            <a:pPr algn="ctr"/>
+            <a:r>
+              <a:rPr lang="en-US" sz="1600" b="1" dirty="0" smtClean="0"/>
+              <a:t>*PageE2ETest</a:t>
+            </a:r>
+            <a:endParaRPr lang="en-SG" sz="1600" b="1" dirty="0"/>
+          </a:p>
+        </p:txBody>
+      </p:sp>
+      <p:cxnSp>
+        <p:nvCxnSpPr>
+          <p:cNvPr id="4" name="Elbow Connector 3"/>
+          <p:cNvCxnSpPr>
+            <a:stCxn id="38" idx="1"/>
+            <a:endCxn id="203" idx="3"/>
+          </p:cNvCxnSpPr>
+          <p:nvPr/>
+        </p:nvCxnSpPr>
+        <p:spPr>
+          <a:xfrm rot="10800000" flipV="1">
+            <a:off x="3622676" y="3053681"/>
+            <a:ext cx="1449025" cy="533524"/>
+          </a:xfrm>
+          <a:prstGeom prst="bentConnector3">
+            <a:avLst/>
+          </a:prstGeom>
+          <a:ln w="25400">
+            <a:solidFill>
+              <a:schemeClr val="accent6">
+                <a:lumMod val="75000"/>
+              </a:schemeClr>
+            </a:solidFill>
+          </a:ln>
+        </p:spPr>
+        <p:style>
+          <a:lnRef idx="1">
+            <a:schemeClr val="accent2"/>
+          </a:lnRef>
+          <a:fillRef idx="0">
+            <a:schemeClr val="accent2"/>
+          </a:fillRef>
+          <a:effectRef idx="0">
+            <a:schemeClr val="accent2"/>
+          </a:effectRef>
+          <a:fontRef idx="minor">
+            <a:schemeClr val="tx1"/>
+          </a:fontRef>
+        </p:style>
+      </p:cxnSp>
+      <p:cxnSp>
+        <p:nvCxnSpPr>
+          <p:cNvPr id="43" name="Elbow Connector 42"/>
+          <p:cNvCxnSpPr>
+            <a:stCxn id="39" idx="1"/>
+            <a:endCxn id="203" idx="3"/>
+          </p:cNvCxnSpPr>
+          <p:nvPr/>
+        </p:nvCxnSpPr>
+        <p:spPr>
+          <a:xfrm rot="10800000">
+            <a:off x="3622676" y="3587205"/>
+            <a:ext cx="1449025" cy="511148"/>
+          </a:xfrm>
+          <a:prstGeom prst="bentConnector3">
+            <a:avLst/>
+          </a:prstGeom>
+          <a:ln w="25400">
+            <a:solidFill>
+              <a:schemeClr val="accent6">
+                <a:lumMod val="75000"/>
+              </a:schemeClr>
+            </a:solidFill>
+          </a:ln>
+        </p:spPr>
+        <p:style>
+          <a:lnRef idx="1">
+            <a:schemeClr val="accent2"/>
+          </a:lnRef>
+          <a:fillRef idx="0">
+            <a:schemeClr val="accent2"/>
+          </a:fillRef>
+          <a:effectRef idx="0">
+            <a:schemeClr val="accent2"/>
+          </a:effectRef>
+          <a:fontRef idx="minor">
+            <a:schemeClr val="tx1"/>
+          </a:fontRef>
+        </p:style>
+      </p:cxnSp>
+      <p:cxnSp>
+        <p:nvCxnSpPr>
+          <p:cNvPr id="8" name="Straight Connector 7"/>
+          <p:cNvCxnSpPr>
+            <a:stCxn id="203" idx="3"/>
+            <a:endCxn id="199" idx="1"/>
+          </p:cNvCxnSpPr>
+          <p:nvPr/>
+        </p:nvCxnSpPr>
+        <p:spPr>
+          <a:xfrm flipV="1">
+            <a:off x="3622675" y="3587204"/>
+            <a:ext cx="1450223" cy="1"/>
+          </a:xfrm>
+          <a:prstGeom prst="line">
+            <a:avLst/>
+          </a:prstGeom>
+          <a:ln w="25400">
+            <a:solidFill>
+              <a:schemeClr val="accent6">
+                <a:lumMod val="75000"/>
+              </a:schemeClr>
+            </a:solidFill>
+          </a:ln>
+        </p:spPr>
+        <p:style>
+          <a:lnRef idx="1">
+            <a:schemeClr val="accent2"/>
+          </a:lnRef>
+          <a:fillRef idx="0">
+            <a:schemeClr val="accent2"/>
+          </a:fillRef>
+          <a:effectRef idx="0">
+            <a:schemeClr val="accent2"/>
+          </a:effectRef>
+          <a:fontRef idx="minor">
+            <a:schemeClr val="tx1"/>
+          </a:fontRef>
+        </p:style>
+      </p:cxnSp>
+      <p:sp>
+        <p:nvSpPr>
+          <p:cNvPr id="48" name="Isosceles Triangle 47"/>
+          <p:cNvSpPr/>
+          <p:nvPr/>
+        </p:nvSpPr>
+        <p:spPr>
+          <a:xfrm rot="16200000" flipH="1">
+            <a:off x="3622676" y="3515205"/>
+            <a:ext cx="144000" cy="144000"/>
+          </a:xfrm>
+          <a:prstGeom prst="triangle">
+            <a:avLst/>
+          </a:prstGeom>
+        </p:spPr>
+        <p:style>
+          <a:lnRef idx="2">
+            <a:schemeClr val="accent6">
+              <a:shade val="50000"/>
+            </a:schemeClr>
+          </a:lnRef>
+          <a:fillRef idx="1">
+            <a:schemeClr val="accent6"/>
+          </a:fillRef>
+          <a:effectRef idx="0">
+            <a:schemeClr val="accent6"/>
+          </a:effectRef>
+          <a:fontRef idx="minor">
+            <a:schemeClr val="lt1"/>
+          </a:fontRef>
+        </p:style>
+        <p:txBody>
+          <a:bodyPr rtlCol="0" anchor="ctr"/>
+          <a:lstStyle/>
+          <a:p>
+            <a:pPr algn="ctr"/>
+            <a:endParaRPr lang="en-SG" sz="1600" b="1"/>
           </a:p>
         </p:txBody>
       </p:sp>

</xml_diff>